<commit_message>
Added Jadad and PEDro scores
</commit_message>
<xml_diff>
--- a/src/intro.pptx
+++ b/src/intro.pptx
@@ -22462,18 +22462,16 @@
                   <m:oMath xmlns:m="http://schemas.openxmlformats.org/officeDocument/2006/math">
                     <m:sSub>
                       <m:e>
-                        <m:groupChr>
-                          <m:groupChrPr>
+                        <m:acc>
+                          <m:accPr>
                             <m:chr m:val="̂"/>
-                            <m:pos m:val="top"/>
-                            <m:vertJc m:val="bot"/>
-                          </m:groupChrPr>
+                          </m:accPr>
                           <m:e>
                             <m:r>
                               <m:t>θ</m:t>
                             </m:r>
                           </m:e>
-                        </m:groupChr>
+                        </m:acc>
                       </m:e>
                       <m:sub>
                         <m:r>
@@ -22638,18 +22636,16 @@
                   <m:oMath xmlns:m="http://schemas.openxmlformats.org/officeDocument/2006/math">
                     <m:sSub>
                       <m:e>
-                        <m:groupChr>
-                          <m:groupChrPr>
+                        <m:acc>
+                          <m:accPr>
                             <m:chr m:val="̂"/>
-                            <m:pos m:val="top"/>
-                            <m:vertJc m:val="bot"/>
-                          </m:groupChrPr>
+                          </m:accPr>
                           <m:e>
                             <m:r>
                               <m:t>θ</m:t>
                             </m:r>
                           </m:e>
-                        </m:groupChr>
+                        </m:acc>
                       </m:e>
                       <m:sub>
                         <m:r>
@@ -23630,18 +23626,16 @@
                         <m:r>
                           <m:t>2</m:t>
                         </m:r>
-                        <m:groupChr>
-                          <m:groupChrPr>
+                        <m:acc>
+                          <m:accPr>
                             <m:chr m:val="̂"/>
-                            <m:pos m:val="top"/>
-                            <m:vertJc m:val="bot"/>
-                          </m:groupChrPr>
+                          </m:accPr>
                           <m:e>
                             <m:r>
                               <m:t>ρ</m:t>
                             </m:r>
                           </m:e>
-                        </m:groupChr>
+                        </m:acc>
                         <m:sSub>
                           <m:e>
                             <m:r>
@@ -24723,10 +24717,110 @@
                 <a:pPr lvl="0" marL="0" indent="0">
                   <a:buNone/>
                 </a:pPr>
-                <a:r>
-                  <a:rPr/>
-                  <a:t>$V(_i) +;(SMD)</a:t>
-                </a:r>
+                <a14:m>
+                  <m:oMath xmlns:m="http://schemas.openxmlformats.org/officeDocument/2006/math">
+                    <m:r>
+                      <m:t>V</m:t>
+                    </m:r>
+                    <m:r>
+                      <m:t>(</m:t>
+                    </m:r>
+                    <m:sSub>
+                      <m:e>
+                        <m:acc>
+                          <m:accPr>
+                            <m:chr m:val="̂"/>
+                          </m:accPr>
+                          <m:e>
+                            <m:r>
+                              <m:t>θ</m:t>
+                            </m:r>
+                          </m:e>
+                        </m:acc>
+                      </m:e>
+                      <m:sub>
+                        <m:r>
+                          <m:t>i</m:t>
+                        </m:r>
+                      </m:sub>
+                    </m:sSub>
+                    <m:r>
+                      <m:t>)</m:t>
+                    </m:r>
+                    <m:r>
+                      <m:t>≈</m:t>
+                    </m:r>
+                    <m:f>
+                      <m:fPr>
+                        <m:type m:val="bar"/>
+                      </m:fPr>
+                      <m:num>
+                        <m:r>
+                          <m:t>1</m:t>
+                        </m:r>
+                      </m:num>
+                      <m:den>
+                        <m:sSub>
+                          <m:e>
+                            <m:r>
+                              <m:t>n</m:t>
+                            </m:r>
+                          </m:e>
+                          <m:sub>
+                            <m:r>
+                              <m:t>T</m:t>
+                            </m:r>
+                          </m:sub>
+                        </m:sSub>
+                      </m:den>
+                    </m:f>
+                    <m:r>
+                      <m:t>+</m:t>
+                    </m:r>
+                    <m:f>
+                      <m:fPr>
+                        <m:type m:val="bar"/>
+                      </m:fPr>
+                      <m:num>
+                        <m:r>
+                          <m:t>1</m:t>
+                        </m:r>
+                      </m:num>
+                      <m:den>
+                        <m:sSub>
+                          <m:e>
+                            <m:r>
+                              <m:t>n</m:t>
+                            </m:r>
+                          </m:e>
+                          <m:sub>
+                            <m:r>
+                              <m:t>C</m:t>
+                            </m:r>
+                          </m:sub>
+                        </m:sSub>
+                      </m:den>
+                    </m:f>
+                    <m:r>
+                      <m:t> </m:t>
+                    </m:r>
+                    <m:r>
+                      <m:t>(</m:t>
+                    </m:r>
+                    <m:r>
+                      <m:t>S</m:t>
+                    </m:r>
+                    <m:r>
+                      <m:t>M</m:t>
+                    </m:r>
+                    <m:r>
+                      <m:t>D</m:t>
+                    </m:r>
+                    <m:r>
+                      <m:t>)</m:t>
+                    </m:r>
+                  </m:oMath>
+                </a14:m>
               </a:p>
               <a:p>
                 <a:pPr lvl="0" marL="0" indent="0">
@@ -24776,18 +24870,16 @@
                         </m:r>
                         <m:sSub>
                           <m:e>
-                            <m:groupChr>
-                              <m:groupChrPr>
+                            <m:acc>
+                              <m:accPr>
                                 <m:chr m:val="̂"/>
-                                <m:pos m:val="top"/>
-                                <m:vertJc m:val="bot"/>
-                              </m:groupChrPr>
+                              </m:accPr>
                               <m:e>
                                 <m:r>
                                   <m:t>θ</m:t>
                                 </m:r>
                               </m:e>
-                            </m:groupChr>
+                            </m:acc>
                           </m:e>
                           <m:sub>
                             <m:r>
@@ -24900,18 +24992,16 @@
                 </a:pPr>
                 <a14:m>
                   <m:oMath xmlns:m="http://schemas.openxmlformats.org/officeDocument/2006/math">
-                    <m:groupChr>
-                      <m:groupChrPr>
+                    <m:acc>
+                      <m:accPr>
                         <m:chr m:val="̂"/>
-                        <m:pos m:val="top"/>
-                        <m:vertJc m:val="bot"/>
-                      </m:groupChrPr>
+                      </m:accPr>
                       <m:e>
                         <m:r>
                           <m:t>θ</m:t>
                         </m:r>
                       </m:e>
-                    </m:groupChr>
+                    </m:acc>
                     <m:r>
                       <m:t>=</m:t>
                     </m:r>
@@ -24937,18 +25027,16 @@
                         </m:sSub>
                         <m:sSub>
                           <m:e>
-                            <m:groupChr>
-                              <m:groupChrPr>
+                            <m:acc>
+                              <m:accPr>
                                 <m:chr m:val="̂"/>
-                                <m:pos m:val="top"/>
-                                <m:vertJc m:val="bot"/>
-                              </m:groupChrPr>
+                              </m:accPr>
                               <m:e>
                                 <m:r>
                                   <m:t>θ</m:t>
                                 </m:r>
                               </m:e>
-                            </m:groupChr>
+                            </m:acc>
                           </m:e>
                           <m:sub>
                             <m:r>
@@ -24990,18 +25078,16 @@
                     <m:r>
                       <m:t>(</m:t>
                     </m:r>
-                    <m:groupChr>
-                      <m:groupChrPr>
+                    <m:acc>
+                      <m:accPr>
                         <m:chr m:val="̂"/>
-                        <m:pos m:val="top"/>
-                        <m:vertJc m:val="bot"/>
-                      </m:groupChrPr>
+                      </m:accPr>
                       <m:e>
                         <m:r>
                           <m:t>θ</m:t>
                         </m:r>
                       </m:e>
-                    </m:groupChr>
+                    </m:acc>
                     <m:r>
                       <m:t>)</m:t>
                     </m:r>
@@ -25051,18 +25137,16 @@
                       <m:num>
                         <m:sSup>
                           <m:e>
-                            <m:groupChr>
-                              <m:groupChrPr>
+                            <m:acc>
+                              <m:accPr>
                                 <m:chr m:val="̂"/>
-                                <m:pos m:val="top"/>
-                                <m:vertJc m:val="bot"/>
-                              </m:groupChrPr>
+                              </m:accPr>
                               <m:e>
                                 <m:r>
                                   <m:t>θ</m:t>
                                 </m:r>
                               </m:e>
-                            </m:groupChr>
+                            </m:acc>
                           </m:e>
                           <m:sup>
                             <m:r>
@@ -25078,18 +25162,16 @@
                         <m:r>
                           <m:t>(</m:t>
                         </m:r>
-                        <m:groupChr>
-                          <m:groupChrPr>
+                        <m:acc>
+                          <m:accPr>
                             <m:chr m:val="̂"/>
-                            <m:pos m:val="top"/>
-                            <m:vertJc m:val="bot"/>
-                          </m:groupChrPr>
+                          </m:accPr>
                           <m:e>
                             <m:r>
                               <m:t>θ</m:t>
                             </m:r>
                           </m:e>
-                        </m:groupChr>
+                        </m:acc>
                         <m:r>
                           <m:t>)</m:t>
                         </m:r>
@@ -25238,18 +25320,16 @@
                     </m:r>
                     <m:sSub>
                       <m:e>
-                        <m:groupChr>
-                          <m:groupChrPr>
+                        <m:acc>
+                          <m:accPr>
                             <m:chr m:val="̂"/>
-                            <m:pos m:val="top"/>
-                            <m:vertJc m:val="bot"/>
-                          </m:groupChrPr>
+                          </m:accPr>
                           <m:e>
                             <m:r>
                               <m:t>θ</m:t>
                             </m:r>
                           </m:e>
-                        </m:groupChr>
+                        </m:acc>
                       </m:e>
                       <m:sub>
                         <m:r>
@@ -25260,18 +25340,16 @@
                     <m:r>
                       <m:t>−</m:t>
                     </m:r>
-                    <m:groupChr>
-                      <m:groupChrPr>
+                    <m:acc>
+                      <m:accPr>
                         <m:chr m:val="̂"/>
-                        <m:pos m:val="top"/>
-                        <m:vertJc m:val="bot"/>
-                      </m:groupChrPr>
+                      </m:accPr>
                       <m:e>
                         <m:r>
                           <m:t>θ</m:t>
                         </m:r>
                       </m:e>
-                    </m:groupChr>
+                    </m:acc>
                     <m:sSup>
                       <m:e>
                         <m:r>
@@ -25489,18 +25567,16 @@
                   <m:oMath xmlns:m="http://schemas.openxmlformats.org/officeDocument/2006/math">
                     <m:sSup>
                       <m:e>
-                        <m:groupChr>
-                          <m:groupChrPr>
+                        <m:acc>
+                          <m:accPr>
                             <m:chr m:val="̂"/>
-                            <m:pos m:val="top"/>
-                            <m:vertJc m:val="bot"/>
-                          </m:groupChrPr>
+                          </m:accPr>
                           <m:e>
                             <m:r>
                               <m:t>τ</m:t>
                             </m:r>
                           </m:e>
-                        </m:groupChr>
+                        </m:acc>
                       </m:e>
                       <m:sup>
                         <m:r>
@@ -25600,18 +25676,16 @@
                         </m:r>
                         <m:sSub>
                           <m:e>
-                            <m:groupChr>
-                              <m:groupChrPr>
+                            <m:acc>
+                              <m:accPr>
                                 <m:chr m:val="̂"/>
-                                <m:pos m:val="top"/>
-                                <m:vertJc m:val="bot"/>
-                              </m:groupChrPr>
+                              </m:accPr>
                               <m:e>
                                 <m:r>
                                   <m:t>θ</m:t>
                                 </m:r>
                               </m:e>
-                            </m:groupChr>
+                            </m:acc>
                           </m:e>
                           <m:sub>
                             <m:r>
@@ -25627,18 +25701,16 @@
                         </m:r>
                         <m:sSup>
                           <m:e>
-                            <m:groupChr>
-                              <m:groupChrPr>
+                            <m:acc>
+                              <m:accPr>
                                 <m:chr m:val="̂"/>
-                                <m:pos m:val="top"/>
-                                <m:vertJc m:val="bot"/>
-                              </m:groupChrPr>
+                              </m:accPr>
                               <m:e>
                                 <m:r>
                                   <m:t>τ</m:t>
                                 </m:r>
                               </m:e>
-                            </m:groupChr>
+                            </m:acc>
                           </m:e>
                           <m:sup>
                             <m:r>

</xml_diff>

<commit_message>
Included Jadad and PEDro scores
</commit_message>
<xml_diff>
--- a/src/intro.pptx
+++ b/src/intro.pptx
@@ -2638,548 +2638,8 @@
 </p:notes>
 </file>
 
-<file path=ppt/notesSlides/notesSlide13.xml><?xml version="1.0" encoding="utf-8"?>
-<p:notes xmlns:a="http://schemas.openxmlformats.org/drawingml/2006/main" xmlns:r="http://schemas.openxmlformats.org/officeDocument/2006/relationships" xmlns:p="http://schemas.openxmlformats.org/presentationml/2006/main">
-  <p:cSld>
-    <p:spTree>
-      <p:nvGrpSpPr>
-        <p:cNvPr id="1" name=""/>
-        <p:cNvGrpSpPr/>
-        <p:nvPr/>
-      </p:nvGrpSpPr>
-      <p:grpSpPr>
-        <a:xfrm>
-          <a:off x="0" y="0"/>
-          <a:ext cx="0" cy="0"/>
-          <a:chOff x="0" y="0"/>
-          <a:chExt cx="0" cy="0"/>
-        </a:xfrm>
-      </p:grpSpPr>
-      <p:sp>
-        <p:nvSpPr>
-          <p:cNvPr id="2" name="Slide Image Placeholder 1"/>
-          <p:cNvSpPr>
-            <a:spLocks noGrp="1" noRot="1" noChangeAspect="1"/>
-          </p:cNvSpPr>
-          <p:nvPr>
-            <p:ph type="sldImg"/>
-          </p:nvPr>
-        </p:nvSpPr>
-        <p:spPr/>
-      </p:sp>
-      <p:sp>
-        <p:nvSpPr>
-          <p:cNvPr id="3" name="Notes Placeholder 2"/>
-          <p:cNvSpPr>
-            <a:spLocks noGrp="1"/>
-          </p:cNvSpPr>
-          <p:nvPr>
-            <p:ph type="body" idx="1"/>
-          </p:nvPr>
-        </p:nvSpPr>
-        <p:spPr/>
-        <p:txBody>
-          <a:bodyPr/>
-          <a:lstStyle/>
-          <a:p>
-            <a:pPr lvl="0" marL="0" indent="0">
-              <a:buNone/>
-            </a:pPr>
-            <a:r>
-              <a:rPr/>
-              <a:t>Meta-analysis</a:t>
-            </a:r>
-            <a:r>
-              <a:rPr/>
-              <a:t> </a:t>
-            </a:r>
-            <a:r>
-              <a:rPr/>
-              <a:t>cannot</a:t>
-            </a:r>
-            <a:r>
-              <a:rPr/>
-              <a:t> </a:t>
-            </a:r>
-            <a:r>
-              <a:rPr/>
-              <a:t>remove</a:t>
-            </a:r>
-            <a:r>
-              <a:rPr/>
-              <a:t> </a:t>
-            </a:r>
-            <a:r>
-              <a:rPr/>
-              <a:t>the</a:t>
-            </a:r>
-            <a:r>
-              <a:rPr/>
-              <a:t> </a:t>
-            </a:r>
-            <a:r>
-              <a:rPr/>
-              <a:t>biases</a:t>
-            </a:r>
-            <a:r>
-              <a:rPr/>
-              <a:t> </a:t>
-            </a:r>
-            <a:r>
-              <a:rPr/>
-              <a:t>and</a:t>
-            </a:r>
-            <a:r>
-              <a:rPr/>
-              <a:t> </a:t>
-            </a:r>
-            <a:r>
-              <a:rPr/>
-              <a:t>imprecision</a:t>
-            </a:r>
-            <a:r>
-              <a:rPr/>
-              <a:t> </a:t>
-            </a:r>
-            <a:r>
-              <a:rPr/>
-              <a:t>associated</a:t>
-            </a:r>
-            <a:r>
-              <a:rPr/>
-              <a:t> </a:t>
-            </a:r>
-            <a:r>
-              <a:rPr/>
-              <a:t>with</a:t>
-            </a:r>
-            <a:r>
-              <a:rPr/>
-              <a:t> </a:t>
-            </a:r>
-            <a:r>
-              <a:rPr/>
-              <a:t>poor</a:t>
-            </a:r>
-            <a:r>
-              <a:rPr/>
-              <a:t> </a:t>
-            </a:r>
-            <a:r>
-              <a:rPr/>
-              <a:t>research</a:t>
-            </a:r>
-            <a:r>
-              <a:rPr/>
-              <a:t> </a:t>
-            </a:r>
-            <a:r>
-              <a:rPr/>
-              <a:t>methodologies.</a:t>
-            </a:r>
-            <a:r>
-              <a:rPr/>
-              <a:t> </a:t>
-            </a:r>
-            <a:r>
-              <a:rPr/>
-              <a:t>If</a:t>
-            </a:r>
-            <a:r>
-              <a:rPr/>
-              <a:t> </a:t>
-            </a:r>
-            <a:r>
-              <a:rPr/>
-              <a:t>all</a:t>
-            </a:r>
-            <a:r>
-              <a:rPr/>
-              <a:t> </a:t>
-            </a:r>
-            <a:r>
-              <a:rPr/>
-              <a:t>of</a:t>
-            </a:r>
-            <a:r>
-              <a:rPr/>
-              <a:t> </a:t>
-            </a:r>
-            <a:r>
-              <a:rPr/>
-              <a:t>the</a:t>
-            </a:r>
-            <a:r>
-              <a:rPr/>
-              <a:t> </a:t>
-            </a:r>
-            <a:r>
-              <a:rPr/>
-              <a:t>studies</a:t>
-            </a:r>
-            <a:r>
-              <a:rPr/>
-              <a:t> </a:t>
-            </a:r>
-            <a:r>
-              <a:rPr/>
-              <a:t>have</a:t>
-            </a:r>
-            <a:r>
-              <a:rPr/>
-              <a:t> </a:t>
-            </a:r>
-            <a:r>
-              <a:rPr/>
-              <a:t>“</a:t>
-            </a:r>
-            <a:r>
-              <a:rPr/>
-              <a:t>issues</a:t>
-            </a:r>
-            <a:r>
-              <a:rPr/>
-              <a:t>”</a:t>
-            </a:r>
-            <a:r>
-              <a:rPr/>
-              <a:t> </a:t>
-            </a:r>
-            <a:r>
-              <a:rPr/>
-              <a:t>then</a:t>
-            </a:r>
-            <a:r>
-              <a:rPr/>
-              <a:t> </a:t>
-            </a:r>
-            <a:r>
-              <a:rPr/>
-              <a:t>a</a:t>
-            </a:r>
-            <a:r>
-              <a:rPr/>
-              <a:t> </a:t>
-            </a:r>
-            <a:r>
-              <a:rPr/>
-              <a:t>meta-analysis</a:t>
-            </a:r>
-            <a:r>
-              <a:rPr/>
-              <a:t> </a:t>
-            </a:r>
-            <a:r>
-              <a:rPr/>
-              <a:t>will</a:t>
-            </a:r>
-            <a:r>
-              <a:rPr/>
-              <a:t> </a:t>
-            </a:r>
-            <a:r>
-              <a:rPr/>
-              <a:t>amplify</a:t>
-            </a:r>
-            <a:r>
-              <a:rPr/>
-              <a:t> </a:t>
-            </a:r>
-            <a:r>
-              <a:rPr/>
-              <a:t>those</a:t>
-            </a:r>
-            <a:r>
-              <a:rPr/>
-              <a:t> </a:t>
-            </a:r>
-            <a:r>
-              <a:rPr/>
-              <a:t>issues.</a:t>
-            </a:r>
-          </a:p>
-          <a:p>
-            <a:pPr lvl="0" marL="0" indent="0">
-              <a:buNone/>
-            </a:pPr>
-          </a:p>
-          <a:p>
-            <a:pPr lvl="0" marL="0" indent="0">
-              <a:buNone/>
-            </a:pPr>
-            <a:r>
-              <a:rPr/>
-              <a:t>You</a:t>
-            </a:r>
-            <a:r>
-              <a:rPr/>
-              <a:t> </a:t>
-            </a:r>
-            <a:r>
-              <a:rPr/>
-              <a:t>can</a:t>
-            </a:r>
-            <a:r>
-              <a:rPr/>
-              <a:t> </a:t>
-            </a:r>
-            <a:r>
-              <a:rPr/>
-              <a:t>assess</a:t>
-            </a:r>
-            <a:r>
-              <a:rPr/>
-              <a:t> </a:t>
-            </a:r>
-            <a:r>
-              <a:rPr/>
-              <a:t>quality</a:t>
-            </a:r>
-            <a:r>
-              <a:rPr/>
-              <a:t> </a:t>
-            </a:r>
-            <a:r>
-              <a:rPr/>
-              <a:t>issues</a:t>
-            </a:r>
-            <a:r>
-              <a:rPr/>
-              <a:t> </a:t>
-            </a:r>
-            <a:r>
-              <a:rPr/>
-              <a:t>by</a:t>
-            </a:r>
-            <a:r>
-              <a:rPr/>
-              <a:t> </a:t>
-            </a:r>
-            <a:r>
-              <a:rPr/>
-              <a:t>limiting</a:t>
-            </a:r>
-            <a:r>
-              <a:rPr/>
-              <a:t> </a:t>
-            </a:r>
-            <a:r>
-              <a:rPr/>
-              <a:t>studies</a:t>
-            </a:r>
-            <a:r>
-              <a:rPr/>
-              <a:t> </a:t>
-            </a:r>
-            <a:r>
-              <a:rPr/>
-              <a:t>based</a:t>
-            </a:r>
-            <a:r>
-              <a:rPr/>
-              <a:t> </a:t>
-            </a:r>
-            <a:r>
-              <a:rPr/>
-              <a:t>on</a:t>
-            </a:r>
-            <a:r>
-              <a:rPr/>
-              <a:t> </a:t>
-            </a:r>
-            <a:r>
-              <a:rPr/>
-              <a:t>scoring</a:t>
-            </a:r>
-            <a:r>
-              <a:rPr/>
-              <a:t> </a:t>
-            </a:r>
-            <a:r>
-              <a:rPr/>
-              <a:t>systems</a:t>
-            </a:r>
-            <a:r>
-              <a:rPr/>
-              <a:t> </a:t>
-            </a:r>
-            <a:r>
-              <a:rPr/>
-              <a:t>like</a:t>
-            </a:r>
-            <a:r>
-              <a:rPr/>
-              <a:t> </a:t>
-            </a:r>
-            <a:r>
-              <a:rPr/>
-              <a:t>Jadad</a:t>
-            </a:r>
-            <a:r>
-              <a:rPr/>
-              <a:t> </a:t>
-            </a:r>
-            <a:r>
-              <a:rPr/>
-              <a:t>or</a:t>
-            </a:r>
-            <a:r>
-              <a:rPr/>
-              <a:t> </a:t>
-            </a:r>
-            <a:r>
-              <a:rPr/>
-              <a:t>PEDro</a:t>
-            </a:r>
-            <a:r>
-              <a:rPr/>
-              <a:t> </a:t>
-            </a:r>
-            <a:r>
-              <a:rPr/>
-              <a:t>or</a:t>
-            </a:r>
-            <a:r>
-              <a:rPr/>
-              <a:t> </a:t>
-            </a:r>
-            <a:r>
-              <a:rPr/>
-              <a:t>by</a:t>
-            </a:r>
-            <a:r>
-              <a:rPr/>
-              <a:t> </a:t>
-            </a:r>
-            <a:r>
-              <a:rPr/>
-              <a:t>weighting</a:t>
-            </a:r>
-            <a:r>
-              <a:rPr/>
-              <a:t> </a:t>
-            </a:r>
-            <a:r>
-              <a:rPr/>
-              <a:t>studies</a:t>
-            </a:r>
-            <a:r>
-              <a:rPr/>
-              <a:t> </a:t>
-            </a:r>
-            <a:r>
-              <a:rPr/>
-              <a:t>based</a:t>
-            </a:r>
-            <a:r>
-              <a:rPr/>
-              <a:t> </a:t>
-            </a:r>
-            <a:r>
-              <a:rPr/>
-              <a:t>on</a:t>
-            </a:r>
-            <a:r>
-              <a:rPr/>
-              <a:t> </a:t>
-            </a:r>
-            <a:r>
-              <a:rPr/>
-              <a:t>these</a:t>
-            </a:r>
-            <a:r>
-              <a:rPr/>
-              <a:t> </a:t>
-            </a:r>
-            <a:r>
-              <a:rPr/>
-              <a:t>scores.</a:t>
-            </a:r>
-            <a:r>
-              <a:rPr/>
-              <a:t> </a:t>
-            </a:r>
-            <a:r>
-              <a:rPr/>
-              <a:t>We’ll</a:t>
-            </a:r>
-            <a:r>
-              <a:rPr/>
-              <a:t> </a:t>
-            </a:r>
-            <a:r>
-              <a:rPr/>
-              <a:t>talk</a:t>
-            </a:r>
-            <a:r>
-              <a:rPr/>
-              <a:t> </a:t>
-            </a:r>
-            <a:r>
-              <a:rPr/>
-              <a:t>about</a:t>
-            </a:r>
-            <a:r>
-              <a:rPr/>
-              <a:t> </a:t>
-            </a:r>
-            <a:r>
-              <a:rPr/>
-              <a:t>this</a:t>
-            </a:r>
-            <a:r>
-              <a:rPr/>
-              <a:t> </a:t>
-            </a:r>
-            <a:r>
-              <a:rPr/>
-              <a:t>a</a:t>
-            </a:r>
-            <a:r>
-              <a:rPr/>
-              <a:t> </a:t>
-            </a:r>
-            <a:r>
-              <a:rPr/>
-              <a:t>bit</a:t>
-            </a:r>
-            <a:r>
-              <a:rPr/>
-              <a:t> </a:t>
-            </a:r>
-            <a:r>
-              <a:rPr/>
-              <a:t>later.</a:t>
-            </a:r>
-          </a:p>
-        </p:txBody>
-      </p:sp>
-      <p:sp>
-        <p:nvSpPr>
-          <p:cNvPr id="4" name="Slide Number Placeholder 3"/>
-          <p:cNvSpPr>
-            <a:spLocks noGrp="1"/>
-          </p:cNvSpPr>
-          <p:nvPr>
-            <p:ph type="sldNum" sz="quarter" idx="10"/>
-          </p:nvPr>
-        </p:nvSpPr>
-        <p:spPr/>
-        <p:txBody>
-          <a:bodyPr/>
-          <a:lstStyle/>
-          <a:p>
-            <a:fld id="{18BDFEC3-8487-43E8-A154-7C12CBC1FFF2}" type="slidenum">
-              <a:rPr lang="en-US"/>
-              <a:t>14</a:t>
-            </a:fld>
-            <a:endParaRPr lang="en-US"/>
-          </a:p>
-        </p:txBody>
-      </p:sp>
-    </p:spTree>
-  </p:cSld>
-</p:notes>
+<file path=ppt/notesSlides/notesSlide13.xml><?xml version="1.0" encoding="UTF-8"?>
+<p:notes xmlns:a="http://schemas.openxmlformats.org/drawingml/2006/main" xmlns:r="http://schemas.openxmlformats.org/officeDocument/2006/relationships" xmlns:p="http://schemas.openxmlformats.org/presentationml/2006/main"><p:cSld><p:spTree><p:nvGrpSpPr><p:cNvPr id="1" name="" /><p:cNvGrpSpPr /><p:nvPr /></p:nvGrpSpPr><p:grpSpPr><a:xfrm><a:off x="0" y="0" /><a:ext cx="0" cy="0" /><a:chOff x="0" y="0" /><a:chExt cx="0" cy="0" /></a:xfrm></p:grpSpPr><p:sp><p:nvSpPr><p:cNvPr id="2" name="Slide Image Placeholder 1" /><p:cNvSpPr><a:spLocks noGrp="1" noRot="1" noChangeAspect="1" /></p:cNvSpPr><p:nvPr><p:ph type="sldImg" /></p:nvPr></p:nvSpPr><p:spPr /></p:sp><p:sp><p:nvSpPr><p:cNvPr id="3" name="Notes Placeholder 2" /><p:cNvSpPr><a:spLocks noGrp="1" /></p:cNvSpPr><p:nvPr><p:ph type="body" idx="1" /></p:nvPr></p:nvSpPr><p:spPr /><p:txBody><a:bodyPr /><a:lstStyle /><a:p><a:pPr lvl="0" marL="0" indent="0"><a:buNone /></a:pPr><a:r><a:rPr /><a:t>Meta-analysis</a:t></a:r><a:r><a:rPr /><a:t> </a:t></a:r><a:r><a:rPr /><a:t>cannot</a:t></a:r><a:r><a:rPr /><a:t> </a:t></a:r><a:r><a:rPr /><a:t>remove</a:t></a:r><a:r><a:rPr /><a:t> </a:t></a:r><a:r><a:rPr /><a:t>the</a:t></a:r><a:r><a:rPr /><a:t> </a:t></a:r><a:r><a:rPr /><a:t>biases</a:t></a:r><a:r><a:rPr /><a:t> </a:t></a:r><a:r><a:rPr /><a:t>and</a:t></a:r><a:r><a:rPr /><a:t> </a:t></a:r><a:r><a:rPr /><a:t>imprecision</a:t></a:r><a:r><a:rPr /><a:t> </a:t></a:r><a:r><a:rPr /><a:t>associated</a:t></a:r><a:r><a:rPr /><a:t> </a:t></a:r><a:r><a:rPr /><a:t>with</a:t></a:r><a:r><a:rPr /><a:t> </a:t></a:r><a:r><a:rPr /><a:t>poor</a:t></a:r><a:r><a:rPr /><a:t> </a:t></a:r><a:r><a:rPr /><a:t>research</a:t></a:r><a:r><a:rPr /><a:t> </a:t></a:r><a:r><a:rPr /><a:t>methodologies.</a:t></a:r><a:r><a:rPr /><a:t> </a:t></a:r><a:r><a:rPr /><a:t>If</a:t></a:r><a:r><a:rPr /><a:t> </a:t></a:r><a:r><a:rPr /><a:t>all</a:t></a:r><a:r><a:rPr /><a:t> </a:t></a:r><a:r><a:rPr /><a:t>of</a:t></a:r><a:r><a:rPr /><a:t> </a:t></a:r><a:r><a:rPr /><a:t>the</a:t></a:r><a:r><a:rPr /><a:t> </a:t></a:r><a:r><a:rPr /><a:t>studies</a:t></a:r><a:r><a:rPr /><a:t> </a:t></a:r><a:r><a:rPr /><a:t>have</a:t></a:r><a:r><a:rPr /><a:t> </a:t></a:r><a:r><a:rPr /><a:t>“</a:t></a:r><a:r><a:rPr /><a:t>issues</a:t></a:r><a:r><a:rPr /><a:t>”</a:t></a:r><a:r><a:rPr /><a:t> </a:t></a:r><a:r><a:rPr /><a:t>then</a:t></a:r><a:r><a:rPr /><a:t> </a:t></a:r><a:r><a:rPr /><a:t>a</a:t></a:r><a:r><a:rPr /><a:t> </a:t></a:r><a:r><a:rPr /><a:t>meta-analysis</a:t></a:r><a:r><a:rPr /><a:t> </a:t></a:r><a:r><a:rPr /><a:t>will</a:t></a:r><a:r><a:rPr /><a:t> </a:t></a:r><a:r><a:rPr /><a:t>amplify</a:t></a:r><a:r><a:rPr /><a:t> </a:t></a:r><a:r><a:rPr /><a:t>those</a:t></a:r><a:r><a:rPr /><a:t> </a:t></a:r><a:r><a:rPr /><a:t>issues.</a:t></a:r></a:p><a:p><a:pPr lvl="0" marL="0" indent="0"><a:buNone /></a:pPr></a:p><a:p><a:pPr lvl="0" marL="0" indent="0"><a:buNone /></a:pPr><a:r><a:rPr /><a:t>You</a:t></a:r><a:r><a:rPr /><a:t> </a:t></a:r><a:r><a:rPr /><a:t>can</a:t></a:r><a:r><a:rPr /><a:t> </a:t></a:r><a:r><a:rPr /><a:t>assess</a:t></a:r><a:r><a:rPr /><a:t> </a:t></a:r><a:r><a:rPr /><a:t>quality</a:t></a:r><a:r><a:rPr /><a:t> </a:t></a:r><a:r><a:rPr /><a:t>issues</a:t></a:r><a:r><a:rPr /><a:t> </a:t></a:r><a:r><a:rPr /><a:t>by</a:t></a:r><a:r><a:rPr /><a:t> </a:t></a:r><a:r><a:rPr /><a:t>limiting</a:t></a:r><a:r><a:rPr /><a:t> </a:t></a:r><a:r><a:rPr /><a:t>studies</a:t></a:r><a:r><a:rPr /><a:t> </a:t></a:r><a:r><a:rPr /><a:t>based</a:t></a:r><a:r><a:rPr /><a:t> </a:t></a:r><a:r><a:rPr /><a:t>on</a:t></a:r><a:r><a:rPr /><a:t> </a:t></a:r><a:r><a:rPr /><a:t>scoring</a:t></a:r><a:r><a:rPr /><a:t> </a:t></a:r><a:r><a:rPr /><a:t>systems</a:t></a:r><a:r><a:rPr /><a:t> </a:t></a:r><a:r><a:rPr /><a:t>like</a:t></a:r><a:r><a:rPr /><a:t> </a:t></a:r><a:r><a:rPr /><a:t>Jadad</a:t></a:r><a:r><a:rPr /><a:t> </a:t></a:r><a:r><a:rPr /><a:t>or</a:t></a:r><a:r><a:rPr /><a:t> </a:t></a:r><a:r><a:rPr /><a:t>PEDro</a:t></a:r><a:r><a:rPr /><a:t> </a:t></a:r><a:r><a:rPr /><a:t>or</a:t></a:r><a:r><a:rPr /><a:t> </a:t></a:r><a:r><a:rPr /><a:t>by</a:t></a:r><a:r><a:rPr /><a:t> </a:t></a:r><a:r><a:rPr /><a:t>weighting</a:t></a:r><a:r><a:rPr /><a:t> </a:t></a:r><a:r><a:rPr /><a:t>studies</a:t></a:r><a:r><a:rPr /><a:t> </a:t></a:r><a:r><a:rPr /><a:t>based</a:t></a:r><a:r><a:rPr /><a:t> </a:t></a:r><a:r><a:rPr /><a:t>on</a:t></a:r><a:r><a:rPr /><a:t> </a:t></a:r><a:r><a:rPr /><a:t>these</a:t></a:r><a:r><a:rPr /><a:t> </a:t></a:r><a:r><a:rPr /><a:t>scores.</a:t></a:r><a:r><a:rPr /><a:t> </a:t></a:r><a:r><a:rPr /><a:t>We’ll</a:t></a:r><a:r><a:rPr /><a:t> </a:t></a:r><a:r><a:rPr /><a:t>talk</a:t></a:r><a:r><a:rPr /><a:t> </a:t></a:r><a:r><a:rPr /><a:t>about</a:t></a:r><a:r><a:rPr /><a:t> </a:t></a:r><a:r><a:rPr /><a:t>this</a:t></a:r><a:r><a:rPr /><a:t> </a:t></a:r><a:r><a:rPr /><a:t>a</a:t></a:r><a:r><a:rPr /><a:t> </a:t></a:r><a:r><a:rPr /><a:t>bit</a:t></a:r><a:r><a:rPr /><a:t> </a:t></a:r><a:r><a:rPr /><a:t>later.</a:t></a:r></a:p><a:p><a:pPr lvl="0" marL="0" indent="0"><a:buNone /></a:pPr></a:p><a:p><a:pPr lvl="1"><a:buAutoNum type="arabicPeriod" /></a:pPr><a:r><a:rPr /><a:t>Was</a:t></a:r><a:r><a:rPr /><a:t> </a:t></a:r><a:r><a:rPr /><a:t>the</a:t></a:r><a:r><a:rPr /><a:t> </a:t></a:r><a:r><a:rPr /><a:t>study</a:t></a:r><a:r><a:rPr /><a:t> </a:t></a:r><a:r><a:rPr /><a:t>described</a:t></a:r><a:r><a:rPr /><a:t> </a:t></a:r><a:r><a:rPr /><a:t>as</a:t></a:r><a:r><a:rPr /><a:t> </a:t></a:r><a:r><a:rPr /><a:t>randomized</a:t></a:r><a:r><a:rPr /><a:t> </a:t></a:r><a:r><a:rPr /><a:t>(this</a:t></a:r><a:r><a:rPr /><a:t> </a:t></a:r><a:r><a:rPr /><a:t>includes</a:t></a:r><a:r><a:rPr /><a:t> </a:t></a:r><a:r><a:rPr /><a:t>words</a:t></a:r><a:r><a:rPr /><a:t> </a:t></a:r><a:r><a:rPr /><a:t>such</a:t></a:r><a:r><a:rPr /><a:t> </a:t></a:r><a:r><a:rPr /><a:t>as</a:t></a:r><a:r><a:rPr /><a:t> </a:t></a:r><a:r><a:rPr /><a:t>randomly,</a:t></a:r><a:r><a:rPr /><a:t> </a:t></a:r><a:r><a:rPr /><a:t>random,</a:t></a:r><a:r><a:rPr /><a:t> </a:t></a:r><a:r><a:rPr /><a:t>and</a:t></a:r><a:r><a:rPr /><a:t> </a:t></a:r><a:r><a:rPr /><a:t>randomisation)?</a:t></a:r><a:r><a:rPr /><a:t> </a:t></a:r><a:r><a:rPr /><a:t>(+1</a:t></a:r><a:r><a:rPr /><a:t> </a:t></a:r><a:r><a:rPr /><a:t>Point)</a:t></a:r></a:p><a:p><a:pPr lvl="0" marL="0" indent="0"><a:buNone /></a:pPr></a:p><a:p><a:pPr lvl="1"><a:buAutoNum type="arabicPeriod" /></a:pPr><a:r><a:rPr /><a:t>Was</a:t></a:r><a:r><a:rPr /><a:t> </a:t></a:r><a:r><a:rPr /><a:t>the</a:t></a:r><a:r><a:rPr /><a:t> </a:t></a:r><a:r><a:rPr /><a:t>method</a:t></a:r><a:r><a:rPr /><a:t> </a:t></a:r><a:r><a:rPr /><a:t>used</a:t></a:r><a:r><a:rPr /><a:t> </a:t></a:r><a:r><a:rPr /><a:t>to</a:t></a:r><a:r><a:rPr /><a:t> </a:t></a:r><a:r><a:rPr /><a:t>generate</a:t></a:r><a:r><a:rPr /><a:t> </a:t></a:r><a:r><a:rPr /><a:t>the</a:t></a:r><a:r><a:rPr /><a:t> </a:t></a:r><a:r><a:rPr /><a:t>sequence</a:t></a:r><a:r><a:rPr /><a:t> </a:t></a:r><a:r><a:rPr /><a:t>of</a:t></a:r><a:r><a:rPr /><a:t> </a:t></a:r><a:r><a:rPr /><a:t>randomisation</a:t></a:r><a:r><a:rPr /><a:t> </a:t></a:r><a:r><a:rPr /><a:t>described</a:t></a:r><a:r><a:rPr /><a:t> </a:t></a:r><a:r><a:rPr /><a:t>and</a:t></a:r><a:r><a:rPr /><a:t> </a:t></a:r><a:r><a:rPr /><a:t>appropriate</a:t></a:r><a:r><a:rPr /><a:t> </a:t></a:r><a:r><a:rPr /><a:t>(table</a:t></a:r><a:r><a:rPr /><a:t> </a:t></a:r><a:r><a:rPr /><a:t>of</a:t></a:r><a:r><a:rPr /><a:t> </a:t></a:r><a:r><a:rPr /><a:t>random</a:t></a:r><a:r><a:rPr /><a:t> </a:t></a:r><a:r><a:rPr /><a:t>numbers,</a:t></a:r><a:r><a:rPr /><a:t> </a:t></a:r><a:r><a:rPr /><a:t>computer-generated,</a:t></a:r><a:r><a:rPr /><a:t> </a:t></a:r><a:r><a:rPr /><a:t>etc)?</a:t></a:r><a:r><a:rPr /><a:t> </a:t></a:r><a:r><a:rPr /><a:t>(+1</a:t></a:r><a:r><a:rPr /><a:t> </a:t></a:r><a:r><a:rPr /><a:t>Point)</a:t></a:r></a:p><a:p><a:pPr lvl="0" marL="0" indent="0"><a:buNone /></a:pPr></a:p><a:p><a:pPr lvl="1"><a:buAutoNum type="arabicPeriod" /></a:pPr><a:r><a:rPr /><a:t>Was</a:t></a:r><a:r><a:rPr /><a:t> </a:t></a:r><a:r><a:rPr /><a:t>the</a:t></a:r><a:r><a:rPr /><a:t> </a:t></a:r><a:r><a:rPr /><a:t>study</a:t></a:r><a:r><a:rPr /><a:t> </a:t></a:r><a:r><a:rPr /><a:t>described</a:t></a:r><a:r><a:rPr /><a:t> </a:t></a:r><a:r><a:rPr /><a:t>as</a:t></a:r><a:r><a:rPr /><a:t> </a:t></a:r><a:r><a:rPr /><a:t>double</a:t></a:r><a:r><a:rPr /><a:t> </a:t></a:r><a:r><a:rPr /><a:t>blind?</a:t></a:r><a:r><a:rPr /><a:t> </a:t></a:r><a:r><a:rPr /><a:t>(+1</a:t></a:r><a:r><a:rPr /><a:t> </a:t></a:r><a:r><a:rPr /><a:t>Point)</a:t></a:r></a:p><a:p><a:pPr lvl="0" marL="0" indent="0"><a:buNone /></a:pPr></a:p><a:p><a:pPr lvl="1"><a:buAutoNum type="arabicPeriod" /></a:pPr><a:r><a:rPr /><a:t>Was</a:t></a:r><a:r><a:rPr /><a:t> </a:t></a:r><a:r><a:rPr /><a:t>the</a:t></a:r><a:r><a:rPr /><a:t> </a:t></a:r><a:r><a:rPr /><a:t>method</a:t></a:r><a:r><a:rPr /><a:t> </a:t></a:r><a:r><a:rPr /><a:t>of</a:t></a:r><a:r><a:rPr /><a:t> </a:t></a:r><a:r><a:rPr /><a:t>double</a:t></a:r><a:r><a:rPr /><a:t> </a:t></a:r><a:r><a:rPr /><a:t>blinding</a:t></a:r><a:r><a:rPr /><a:t> </a:t></a:r><a:r><a:rPr /><a:t>described</a:t></a:r><a:r><a:rPr /><a:t> </a:t></a:r><a:r><a:rPr /><a:t>and</a:t></a:r><a:r><a:rPr /><a:t> </a:t></a:r><a:r><a:rPr /><a:t>appropriate</a:t></a:r><a:r><a:rPr /><a:t> </a:t></a:r><a:r><a:rPr /><a:t>(identical</a:t></a:r><a:r><a:rPr /><a:t> </a:t></a:r><a:r><a:rPr /><a:t>placebo,</a:t></a:r><a:r><a:rPr /><a:t> </a:t></a:r><a:r><a:rPr /><a:t>active</a:t></a:r><a:r><a:rPr /><a:t> </a:t></a:r><a:r><a:rPr /><a:t>placebo,</a:t></a:r><a:r><a:rPr /><a:t> </a:t></a:r><a:r><a:rPr /><a:t>dummy,</a:t></a:r><a:r><a:rPr /><a:t> </a:t></a:r><a:r><a:rPr /><a:t>etc)?</a:t></a:r><a:r><a:rPr /><a:t> </a:t></a:r><a:r><a:rPr /><a:t>(+1</a:t></a:r><a:r><a:rPr /><a:t> </a:t></a:r><a:r><a:rPr /><a:t>Point)</a:t></a:r></a:p><a:p><a:pPr lvl="0" marL="0" indent="0"><a:buNone /></a:pPr></a:p><a:p><a:pPr lvl="1"><a:buAutoNum type="arabicPeriod" /></a:pPr><a:r><a:rPr /><a:t>Was</a:t></a:r><a:r><a:rPr /><a:t> </a:t></a:r><a:r><a:rPr /><a:t>there</a:t></a:r><a:r><a:rPr /><a:t> </a:t></a:r><a:r><a:rPr /><a:t>a</a:t></a:r><a:r><a:rPr /><a:t> </a:t></a:r><a:r><a:rPr /><a:t>description</a:t></a:r><a:r><a:rPr /><a:t> </a:t></a:r><a:r><a:rPr /><a:t>of</a:t></a:r><a:r><a:rPr /><a:t> </a:t></a:r><a:r><a:rPr /><a:t>withdrawals</a:t></a:r><a:r><a:rPr /><a:t> </a:t></a:r><a:r><a:rPr /><a:t>and</a:t></a:r><a:r><a:rPr /><a:t> </a:t></a:r><a:r><a:rPr /><a:t>dropouts?</a:t></a:r><a:r><a:rPr /><a:t> </a:t></a:r><a:r><a:rPr /><a:t>(+1</a:t></a:r><a:r><a:rPr /><a:t> </a:t></a:r><a:r><a:rPr /><a:t>Point)</a:t></a:r></a:p><a:p><a:pPr lvl="0" marL="0" indent="0"><a:buNone /></a:pPr></a:p><a:p><a:pPr lvl="1"><a:buAutoNum type="arabicPeriod" /></a:pPr><a:r><a:rPr /><a:t>Deduct</a:t></a:r><a:r><a:rPr /><a:t> </a:t></a:r><a:r><a:rPr /><a:t>one</a:t></a:r><a:r><a:rPr /><a:t> </a:t></a:r><a:r><a:rPr /><a:t>point</a:t></a:r><a:r><a:rPr /><a:t> </a:t></a:r><a:r><a:rPr /><a:t>if</a:t></a:r><a:r><a:rPr /><a:t> </a:t></a:r><a:r><a:rPr /><a:t>the</a:t></a:r><a:r><a:rPr /><a:t> </a:t></a:r><a:r><a:rPr /><a:t>method</a:t></a:r><a:r><a:rPr /><a:t> </a:t></a:r><a:r><a:rPr /><a:t>used</a:t></a:r><a:r><a:rPr /><a:t> </a:t></a:r><a:r><a:rPr /><a:t>to</a:t></a:r><a:r><a:rPr /><a:t> </a:t></a:r><a:r><a:rPr /><a:t>generate</a:t></a:r><a:r><a:rPr /><a:t> </a:t></a:r><a:r><a:rPr /><a:t>the</a:t></a:r><a:r><a:rPr /><a:t> </a:t></a:r><a:r><a:rPr /><a:t>sequence</a:t></a:r><a:r><a:rPr /><a:t> </a:t></a:r><a:r><a:rPr /><a:t>of</a:t></a:r><a:r><a:rPr /><a:t> </a:t></a:r><a:r><a:rPr /><a:t>randomisation</a:t></a:r><a:r><a:rPr /><a:t> </a:t></a:r><a:r><a:rPr /><a:t>was</a:t></a:r><a:r><a:rPr /><a:t> </a:t></a:r><a:r><a:rPr /><a:t>described</a:t></a:r><a:r><a:rPr /><a:t> </a:t></a:r><a:r><a:rPr /><a:t>and</a:t></a:r><a:r><a:rPr /><a:t> </a:t></a:r><a:r><a:rPr /><a:t>it</a:t></a:r><a:r><a:rPr /><a:t> </a:t></a:r><a:r><a:rPr /><a:t>was</a:t></a:r><a:r><a:rPr /><a:t> </a:t></a:r><a:r><a:rPr /><a:t>inappropriate</a:t></a:r><a:r><a:rPr /><a:t> </a:t></a:r><a:r><a:rPr /><a:t>(patients</a:t></a:r><a:r><a:rPr /><a:t> </a:t></a:r><a:r><a:rPr /><a:t>were</a:t></a:r><a:r><a:rPr /><a:t> </a:t></a:r><a:r><a:rPr /><a:t>allocated</a:t></a:r><a:r><a:rPr /><a:t> </a:t></a:r><a:r><a:rPr /><a:t>alternately,</a:t></a:r><a:r><a:rPr /><a:t> </a:t></a:r><a:r><a:rPr /><a:t>or</a:t></a:r><a:r><a:rPr /><a:t> </a:t></a:r><a:r><a:rPr /><a:t>according</a:t></a:r><a:r><a:rPr /><a:t> </a:t></a:r><a:r><a:rPr /><a:t>to</a:t></a:r><a:r><a:rPr /><a:t> </a:t></a:r><a:r><a:rPr /><a:t>date</a:t></a:r><a:r><a:rPr /><a:t> </a:t></a:r><a:r><a:rPr /><a:t>of</a:t></a:r><a:r><a:rPr /><a:t> </a:t></a:r><a:r><a:rPr /><a:t>birth,</a:t></a:r><a:r><a:rPr /><a:t> </a:t></a:r><a:r><a:rPr /><a:t>hospital</a:t></a:r><a:r><a:rPr /><a:t> </a:t></a:r><a:r><a:rPr /><a:t>number,</a:t></a:r><a:r><a:rPr /><a:t> </a:t></a:r><a:r><a:rPr /><a:t>etc)</a:t></a:r></a:p><a:p><a:pPr lvl="0" marL="0" indent="0"><a:buNone /></a:pPr></a:p><a:p><a:pPr lvl="1"><a:buAutoNum type="arabicPeriod" /></a:pPr><a:r><a:rPr /><a:t>Deduct</a:t></a:r><a:r><a:rPr /><a:t> </a:t></a:r><a:r><a:rPr /><a:t>one</a:t></a:r><a:r><a:rPr /><a:t> </a:t></a:r><a:r><a:rPr /><a:t>point</a:t></a:r><a:r><a:rPr /><a:t> </a:t></a:r><a:r><a:rPr /><a:t>if</a:t></a:r><a:r><a:rPr /><a:t> </a:t></a:r><a:r><a:rPr /><a:t>the</a:t></a:r><a:r><a:rPr /><a:t> </a:t></a:r><a:r><a:rPr /><a:t>study</a:t></a:r><a:r><a:rPr /><a:t> </a:t></a:r><a:r><a:rPr /><a:t>was</a:t></a:r><a:r><a:rPr /><a:t> </a:t></a:r><a:r><a:rPr /><a:t>described</a:t></a:r><a:r><a:rPr /><a:t> </a:t></a:r><a:r><a:rPr /><a:t>as</a:t></a:r><a:r><a:rPr /><a:t> </a:t></a:r><a:r><a:rPr /><a:t>double</a:t></a:r><a:r><a:rPr /><a:t> </a:t></a:r><a:r><a:rPr /><a:t>blind</a:t></a:r><a:r><a:rPr /><a:t> </a:t></a:r><a:r><a:rPr /><a:t>but</a:t></a:r><a:r><a:rPr /><a:t> </a:t></a:r><a:r><a:rPr /><a:t>the</a:t></a:r><a:r><a:rPr /><a:t> </a:t></a:r><a:r><a:rPr /><a:t>method</a:t></a:r><a:r><a:rPr /><a:t> </a:t></a:r><a:r><a:rPr /><a:t>of</a:t></a:r><a:r><a:rPr /><a:t> </a:t></a:r><a:r><a:rPr /><a:t>blinding</a:t></a:r><a:r><a:rPr /><a:t> </a:t></a:r><a:r><a:rPr /><a:t>was</a:t></a:r><a:r><a:rPr /><a:t> </a:t></a:r><a:r><a:rPr /><a:t>inappropriate</a:t></a:r><a:r><a:rPr /><a:t> </a:t></a:r><a:r><a:rPr /><a:t>(e.g.,</a:t></a:r><a:r><a:rPr /><a:t> </a:t></a:r><a:r><a:rPr /><a:t>comparison</a:t></a:r><a:r><a:rPr /><a:t> </a:t></a:r><a:r><a:rPr /><a:t>of</a:t></a:r><a:r><a:rPr /><a:t> </a:t></a:r><a:r><a:rPr /><a:t>tablet</a:t></a:r><a:r><a:rPr /><a:t> </a:t></a:r><a:r><a:rPr /><a:t>vs. injection</a:t></a:r><a:r><a:rPr /><a:t> </a:t></a:r><a:r><a:rPr /><a:t>with</a:t></a:r><a:r><a:rPr /><a:t> </a:t></a:r><a:r><a:rPr /><a:t>no</a:t></a:r><a:r><a:rPr /><a:t> </a:t></a:r><a:r><a:rPr /><a:t>double</a:t></a:r><a:r><a:rPr /><a:t> </a:t></a:r><a:r><a:rPr /><a:t>dummy).</a:t></a:r></a:p><a:p><a:pPr lvl="0" marL="0" indent="0"><a:buNone /></a:pPr></a:p><a:p><a:pPr lvl="1"><a:buAutoNum type="arabicPeriod" /></a:pPr><a:r><a:rPr /><a:t>eligibility</a:t></a:r><a:r><a:rPr /><a:t> </a:t></a:r><a:r><a:rPr /><a:t>criteria</a:t></a:r><a:r><a:rPr /><a:t> </a:t></a:r><a:r><a:rPr /><a:t>were</a:t></a:r><a:r><a:rPr /><a:t> </a:t></a:r><a:r><a:rPr /><a:t>specified</a:t></a:r><a:r><a:rPr /><a:t> </a:t></a:r><a:r><a:rPr /><a:t>no</a:t></a:r><a:r><a:rPr /><a:t> </a:t></a:r><a:r><a:rPr /><a:t>&#1;</a:t></a:r><a:r><a:rPr /><a:t> </a:t></a:r><a:r><a:rPr /><a:t>yes</a:t></a:r><a:r><a:rPr /><a:t> </a:t></a:r><a:r><a:rPr /><a:t>&#1;</a:t></a:r><a:r><a:rPr /><a:t> </a:t></a:r><a:r><a:rPr /><a:t>where:</a:t></a:r></a:p><a:p><a:pPr lvl="0" marL="0" indent="0"><a:buNone /></a:pPr></a:p><a:p><a:pPr lvl="1"><a:buAutoNum type="arabicPeriod" /></a:pPr><a:r><a:rPr /><a:t>subjects</a:t></a:r><a:r><a:rPr /><a:t> </a:t></a:r><a:r><a:rPr /><a:t>were</a:t></a:r><a:r><a:rPr /><a:t> </a:t></a:r><a:r><a:rPr /><a:t>randomly</a:t></a:r><a:r><a:rPr /><a:t> </a:t></a:r><a:r><a:rPr /><a:t>allocated</a:t></a:r><a:r><a:rPr /><a:t> </a:t></a:r><a:r><a:rPr /><a:t>to</a:t></a:r><a:r><a:rPr /><a:t> </a:t></a:r><a:r><a:rPr /><a:t>groups</a:t></a:r><a:r><a:rPr /><a:t> </a:t></a:r><a:r><a:rPr /><a:t>(in</a:t></a:r><a:r><a:rPr /><a:t> </a:t></a:r><a:r><a:rPr /><a:t>a</a:t></a:r><a:r><a:rPr /><a:t> </a:t></a:r><a:r><a:rPr /><a:t>crossover</a:t></a:r><a:r><a:rPr /><a:t> </a:t></a:r><a:r><a:rPr /><a:t>study,</a:t></a:r><a:r><a:rPr /><a:t> </a:t></a:r><a:r><a:rPr /><a:t>subjects</a:t></a:r><a:r><a:rPr /><a:t> </a:t></a:r><a:r><a:rPr /><a:t>were</a:t></a:r><a:r><a:rPr /><a:t> </a:t></a:r><a:r><a:rPr /><a:t>randomly</a:t></a:r><a:r><a:rPr /><a:t> </a:t></a:r><a:r><a:rPr /><a:t>allocated</a:t></a:r><a:r><a:rPr /><a:t> </a:t></a:r><a:r><a:rPr /><a:t>an</a:t></a:r><a:r><a:rPr /><a:t> </a:t></a:r><a:r><a:rPr /><a:t>order</a:t></a:r><a:r><a:rPr /><a:t> </a:t></a:r><a:r><a:rPr /><a:t>in</a:t></a:r><a:r><a:rPr /><a:t> </a:t></a:r><a:r><a:rPr /><a:t>which</a:t></a:r><a:r><a:rPr /><a:t> </a:t></a:r><a:r><a:rPr /><a:t>treatments</a:t></a:r><a:r><a:rPr /><a:t> </a:t></a:r><a:r><a:rPr /><a:t>were</a:t></a:r><a:r><a:rPr /><a:t> </a:t></a:r><a:r><a:rPr /><a:t>received)</a:t></a:r><a:r><a:rPr /><a:t> </a:t></a:r><a:r><a:rPr /><a:t>no</a:t></a:r><a:r><a:rPr /><a:t> </a:t></a:r><a:r><a:rPr /><a:t>&#1;</a:t></a:r><a:r><a:rPr /><a:t> </a:t></a:r><a:r><a:rPr /><a:t>yes</a:t></a:r><a:r><a:rPr /><a:t> </a:t></a:r><a:r><a:rPr /><a:t>&#1;</a:t></a:r><a:r><a:rPr /><a:t> </a:t></a:r><a:r><a:rPr /><a:t>where:</a:t></a:r></a:p><a:p><a:pPr lvl="0" marL="0" indent="0"><a:buNone /></a:pPr></a:p><a:p><a:pPr lvl="1"><a:buAutoNum type="arabicPeriod" /></a:pPr><a:r><a:rPr /><a:t>allocation</a:t></a:r><a:r><a:rPr /><a:t> </a:t></a:r><a:r><a:rPr /><a:t>was</a:t></a:r><a:r><a:rPr /><a:t> </a:t></a:r><a:r><a:rPr /><a:t>concealed</a:t></a:r><a:r><a:rPr /><a:t> </a:t></a:r><a:r><a:rPr /><a:t>no</a:t></a:r><a:r><a:rPr /><a:t> </a:t></a:r><a:r><a:rPr /><a:t>&#1;</a:t></a:r><a:r><a:rPr /><a:t> </a:t></a:r><a:r><a:rPr /><a:t>yes</a:t></a:r><a:r><a:rPr /><a:t> </a:t></a:r><a:r><a:rPr /><a:t>&#1;</a:t></a:r><a:r><a:rPr /><a:t> </a:t></a:r><a:r><a:rPr /><a:t>where:</a:t></a:r></a:p><a:p><a:pPr lvl="0" marL="0" indent="0"><a:buNone /></a:pPr></a:p><a:p><a:pPr lvl="1"><a:buAutoNum type="arabicPeriod" /></a:pPr><a:r><a:rPr /><a:t>the</a:t></a:r><a:r><a:rPr /><a:t> </a:t></a:r><a:r><a:rPr /><a:t>groups</a:t></a:r><a:r><a:rPr /><a:t> </a:t></a:r><a:r><a:rPr /><a:t>were</a:t></a:r><a:r><a:rPr /><a:t> </a:t></a:r><a:r><a:rPr /><a:t>similar</a:t></a:r><a:r><a:rPr /><a:t> </a:t></a:r><a:r><a:rPr /><a:t>at</a:t></a:r><a:r><a:rPr /><a:t> </a:t></a:r><a:r><a:rPr /><a:t>baseline</a:t></a:r><a:r><a:rPr /><a:t> </a:t></a:r><a:r><a:rPr /><a:t>regarding</a:t></a:r><a:r><a:rPr /><a:t> </a:t></a:r><a:r><a:rPr /><a:t>the</a:t></a:r><a:r><a:rPr /><a:t> </a:t></a:r><a:r><a:rPr /><a:t>most</a:t></a:r><a:r><a:rPr /><a:t> </a:t></a:r><a:r><a:rPr /><a:t>important</a:t></a:r><a:r><a:rPr /><a:t> </a:t></a:r><a:r><a:rPr /><a:t>prognostic</a:t></a:r><a:r><a:rPr /><a:t> </a:t></a:r><a:r><a:rPr /><a:t>indicators</a:t></a:r><a:r><a:rPr /><a:t> </a:t></a:r><a:r><a:rPr /><a:t>no</a:t></a:r><a:r><a:rPr /><a:t> </a:t></a:r><a:r><a:rPr /><a:t>&#1;</a:t></a:r><a:r><a:rPr /><a:t> </a:t></a:r><a:r><a:rPr /><a:t>yes</a:t></a:r><a:r><a:rPr /><a:t> </a:t></a:r><a:r><a:rPr /><a:t>&#1;</a:t></a:r><a:r><a:rPr /><a:t> </a:t></a:r><a:r><a:rPr /><a:t>where:</a:t></a:r></a:p><a:p><a:pPr lvl="0" marL="0" indent="0"><a:buNone /></a:pPr></a:p><a:p><a:pPr lvl="1"><a:buAutoNum type="arabicPeriod" /></a:pPr><a:r><a:rPr /><a:t>there</a:t></a:r><a:r><a:rPr /><a:t> </a:t></a:r><a:r><a:rPr /><a:t>was</a:t></a:r><a:r><a:rPr /><a:t> </a:t></a:r><a:r><a:rPr /><a:t>blinding</a:t></a:r><a:r><a:rPr /><a:t> </a:t></a:r><a:r><a:rPr /><a:t>of</a:t></a:r><a:r><a:rPr /><a:t> </a:t></a:r><a:r><a:rPr /><a:t>all</a:t></a:r><a:r><a:rPr /><a:t> </a:t></a:r><a:r><a:rPr /><a:t>subjects</a:t></a:r><a:r><a:rPr /><a:t> </a:t></a:r><a:r><a:rPr /><a:t>no</a:t></a:r><a:r><a:rPr /><a:t> </a:t></a:r><a:r><a:rPr /><a:t>&#1;</a:t></a:r><a:r><a:rPr /><a:t> </a:t></a:r><a:r><a:rPr /><a:t>yes</a:t></a:r><a:r><a:rPr /><a:t> </a:t></a:r><a:r><a:rPr /><a:t>&#1;</a:t></a:r><a:r><a:rPr /><a:t> </a:t></a:r><a:r><a:rPr /><a:t>where:</a:t></a:r></a:p><a:p><a:pPr lvl="0" marL="0" indent="0"><a:buNone /></a:pPr></a:p><a:p><a:pPr lvl="1"><a:buAutoNum type="arabicPeriod" /></a:pPr><a:r><a:rPr /><a:t>there</a:t></a:r><a:r><a:rPr /><a:t> </a:t></a:r><a:r><a:rPr /><a:t>was</a:t></a:r><a:r><a:rPr /><a:t> </a:t></a:r><a:r><a:rPr /><a:t>blinding</a:t></a:r><a:r><a:rPr /><a:t> </a:t></a:r><a:r><a:rPr /><a:t>of</a:t></a:r><a:r><a:rPr /><a:t> </a:t></a:r><a:r><a:rPr /><a:t>all</a:t></a:r><a:r><a:rPr /><a:t> </a:t></a:r><a:r><a:rPr /><a:t>therapists</a:t></a:r><a:r><a:rPr /><a:t> </a:t></a:r><a:r><a:rPr /><a:t>who</a:t></a:r><a:r><a:rPr /><a:t> </a:t></a:r><a:r><a:rPr /><a:t>administered</a:t></a:r><a:r><a:rPr /><a:t> </a:t></a:r><a:r><a:rPr /><a:t>the</a:t></a:r><a:r><a:rPr /><a:t> </a:t></a:r><a:r><a:rPr /><a:t>therapy</a:t></a:r><a:r><a:rPr /><a:t> </a:t></a:r><a:r><a:rPr /><a:t>no</a:t></a:r><a:r><a:rPr /><a:t> </a:t></a:r><a:r><a:rPr /><a:t>&#1;</a:t></a:r><a:r><a:rPr /><a:t> </a:t></a:r><a:r><a:rPr /><a:t>yes</a:t></a:r><a:r><a:rPr /><a:t> </a:t></a:r><a:r><a:rPr /><a:t>&#1;</a:t></a:r><a:r><a:rPr /><a:t> </a:t></a:r><a:r><a:rPr /><a:t>where:</a:t></a:r></a:p><a:p><a:pPr lvl="0" marL="0" indent="0"><a:buNone /></a:pPr></a:p><a:p><a:pPr lvl="1"><a:buAutoNum type="arabicPeriod" /></a:pPr><a:r><a:rPr /><a:t>there</a:t></a:r><a:r><a:rPr /><a:t> </a:t></a:r><a:r><a:rPr /><a:t>was</a:t></a:r><a:r><a:rPr /><a:t> </a:t></a:r><a:r><a:rPr /><a:t>blinding</a:t></a:r><a:r><a:rPr /><a:t> </a:t></a:r><a:r><a:rPr /><a:t>of</a:t></a:r><a:r><a:rPr /><a:t> </a:t></a:r><a:r><a:rPr /><a:t>all</a:t></a:r><a:r><a:rPr /><a:t> </a:t></a:r><a:r><a:rPr /><a:t>assessors</a:t></a:r><a:r><a:rPr /><a:t> </a:t></a:r><a:r><a:rPr /><a:t>who</a:t></a:r><a:r><a:rPr /><a:t> </a:t></a:r><a:r><a:rPr /><a:t>measured</a:t></a:r><a:r><a:rPr /><a:t> </a:t></a:r><a:r><a:rPr /><a:t>at</a:t></a:r><a:r><a:rPr /><a:t> </a:t></a:r><a:r><a:rPr /><a:t>least</a:t></a:r><a:r><a:rPr /><a:t> </a:t></a:r><a:r><a:rPr /><a:t>one</a:t></a:r><a:r><a:rPr /><a:t> </a:t></a:r><a:r><a:rPr /><a:t>key</a:t></a:r><a:r><a:rPr /><a:t> </a:t></a:r><a:r><a:rPr /><a:t>outcome</a:t></a:r><a:r><a:rPr /><a:t> </a:t></a:r><a:r><a:rPr /><a:t>no</a:t></a:r><a:r><a:rPr /><a:t> </a:t></a:r><a:r><a:rPr /><a:t>&#1;</a:t></a:r><a:r><a:rPr /><a:t> </a:t></a:r><a:r><a:rPr /><a:t>yes</a:t></a:r><a:r><a:rPr /><a:t> </a:t></a:r><a:r><a:rPr /><a:t>&#1;</a:t></a:r><a:r><a:rPr /><a:t> </a:t></a:r><a:r><a:rPr /><a:t>where:</a:t></a:r></a:p><a:p><a:pPr lvl="0" marL="0" indent="0"><a:buNone /></a:pPr></a:p><a:p><a:pPr lvl="1"><a:buAutoNum type="arabicPeriod" /></a:pPr><a:r><a:rPr /><a:t>measures</a:t></a:r><a:r><a:rPr /><a:t> </a:t></a:r><a:r><a:rPr /><a:t>of</a:t></a:r><a:r><a:rPr /><a:t> </a:t></a:r><a:r><a:rPr /><a:t>at</a:t></a:r><a:r><a:rPr /><a:t> </a:t></a:r><a:r><a:rPr /><a:t>least</a:t></a:r><a:r><a:rPr /><a:t> </a:t></a:r><a:r><a:rPr /><a:t>one</a:t></a:r><a:r><a:rPr /><a:t> </a:t></a:r><a:r><a:rPr /><a:t>key</a:t></a:r><a:r><a:rPr /><a:t> </a:t></a:r><a:r><a:rPr /><a:t>outcome</a:t></a:r><a:r><a:rPr /><a:t> </a:t></a:r><a:r><a:rPr /><a:t>were</a:t></a:r><a:r><a:rPr /><a:t> </a:t></a:r><a:r><a:rPr /><a:t>obtained</a:t></a:r><a:r><a:rPr /><a:t> </a:t></a:r><a:r><a:rPr /><a:t>from</a:t></a:r><a:r><a:rPr /><a:t> </a:t></a:r><a:r><a:rPr /><a:t>more</a:t></a:r><a:r><a:rPr /><a:t> </a:t></a:r><a:r><a:rPr /><a:t>than</a:t></a:r><a:r><a:rPr /><a:t> </a:t></a:r><a:r><a:rPr /><a:t>85%</a:t></a:r><a:r><a:rPr /><a:t> </a:t></a:r><a:r><a:rPr /><a:t>of</a:t></a:r><a:r><a:rPr /><a:t> </a:t></a:r><a:r><a:rPr /><a:t>the</a:t></a:r><a:r><a:rPr /><a:t> </a:t></a:r><a:r><a:rPr /><a:t>subjects</a:t></a:r><a:r><a:rPr /><a:t> </a:t></a:r><a:r><a:rPr /><a:t>initially</a:t></a:r><a:r><a:rPr /><a:t> </a:t></a:r><a:r><a:rPr /><a:t>allocated</a:t></a:r><a:r><a:rPr /><a:t> </a:t></a:r><a:r><a:rPr /><a:t>to</a:t></a:r><a:r><a:rPr /><a:t> </a:t></a:r><a:r><a:rPr /><a:t>groups</a:t></a:r><a:r><a:rPr /><a:t> </a:t></a:r><a:r><a:rPr /><a:t>no</a:t></a:r><a:r><a:rPr /><a:t> </a:t></a:r><a:r><a:rPr /><a:t>&#1;</a:t></a:r><a:r><a:rPr /><a:t> </a:t></a:r><a:r><a:rPr /><a:t>yes</a:t></a:r><a:r><a:rPr /><a:t> </a:t></a:r><a:r><a:rPr /><a:t>&#1;</a:t></a:r><a:r><a:rPr /><a:t> </a:t></a:r><a:r><a:rPr /><a:t>where:</a:t></a:r></a:p><a:p><a:pPr lvl="0" marL="0" indent="0"><a:buNone /></a:pPr></a:p><a:p><a:pPr lvl="1"><a:buAutoNum type="arabicPeriod" /></a:pPr><a:r><a:rPr /><a:t>all</a:t></a:r><a:r><a:rPr /><a:t> </a:t></a:r><a:r><a:rPr /><a:t>subjects</a:t></a:r><a:r><a:rPr /><a:t> </a:t></a:r><a:r><a:rPr /><a:t>for</a:t></a:r><a:r><a:rPr /><a:t> </a:t></a:r><a:r><a:rPr /><a:t>whom</a:t></a:r><a:r><a:rPr /><a:t> </a:t></a:r><a:r><a:rPr /><a:t>outcome</a:t></a:r><a:r><a:rPr /><a:t> </a:t></a:r><a:r><a:rPr /><a:t>measures</a:t></a:r><a:r><a:rPr /><a:t> </a:t></a:r><a:r><a:rPr /><a:t>were</a:t></a:r><a:r><a:rPr /><a:t> </a:t></a:r><a:r><a:rPr /><a:t>available</a:t></a:r><a:r><a:rPr /><a:t> </a:t></a:r><a:r><a:rPr /><a:t>received</a:t></a:r><a:r><a:rPr /><a:t> </a:t></a:r><a:r><a:rPr /><a:t>the</a:t></a:r><a:r><a:rPr /><a:t> </a:t></a:r><a:r><a:rPr /><a:t>treatment</a:t></a:r><a:r><a:rPr /><a:t> </a:t></a:r><a:r><a:rPr /><a:t>or</a:t></a:r><a:r><a:rPr /><a:t> </a:t></a:r><a:r><a:rPr /><a:t>control</a:t></a:r><a:r><a:rPr /><a:t> </a:t></a:r><a:r><a:rPr /><a:t>condition</a:t></a:r><a:r><a:rPr /><a:t> </a:t></a:r><a:r><a:rPr /><a:t>as</a:t></a:r><a:r><a:rPr /><a:t> </a:t></a:r><a:r><a:rPr /><a:t>allocated</a:t></a:r><a:r><a:rPr /><a:t> </a:t></a:r><a:r><a:rPr /><a:t>or,</a:t></a:r><a:r><a:rPr /><a:t> </a:t></a:r><a:r><a:rPr /><a:t>where</a:t></a:r><a:r><a:rPr /><a:t> </a:t></a:r><a:r><a:rPr /><a:t>this</a:t></a:r><a:r><a:rPr /><a:t> </a:t></a:r><a:r><a:rPr /><a:t>was</a:t></a:r><a:r><a:rPr /><a:t> </a:t></a:r><a:r><a:rPr /><a:t>not</a:t></a:r><a:r><a:rPr /><a:t> </a:t></a:r><a:r><a:rPr /><a:t>the</a:t></a:r><a:r><a:rPr /><a:t> </a:t></a:r><a:r><a:rPr /><a:t>case,</a:t></a:r><a:r><a:rPr /><a:t> </a:t></a:r><a:r><a:rPr /><a:t>data</a:t></a:r><a:r><a:rPr /><a:t> </a:t></a:r><a:r><a:rPr /><a:t>for</a:t></a:r><a:r><a:rPr /><a:t> </a:t></a:r><a:r><a:rPr /><a:t>at</a:t></a:r><a:r><a:rPr /><a:t> </a:t></a:r><a:r><a:rPr /><a:t>least</a:t></a:r><a:r><a:rPr /><a:t> </a:t></a:r><a:r><a:rPr /><a:t>one</a:t></a:r><a:r><a:rPr /><a:t> </a:t></a:r><a:r><a:rPr /><a:t>key</a:t></a:r><a:r><a:rPr /><a:t> </a:t></a:r><a:r><a:rPr /><a:t>outcome</a:t></a:r><a:r><a:rPr /><a:t> </a:t></a:r><a:r><a:rPr /><a:t>was</a:t></a:r><a:r><a:rPr /><a:t> </a:t></a:r><a:r><a:rPr /><a:t>analysed</a:t></a:r><a:r><a:rPr /><a:t> </a:t></a:r><a:r><a:rPr /><a:t>by</a:t></a:r><a:r><a:rPr /><a:t> </a:t></a:r><a:r><a:rPr /><a:t>“</a:t></a:r><a:r><a:rPr /><a:t>intention</a:t></a:r><a:r><a:rPr /><a:t> </a:t></a:r><a:r><a:rPr /><a:t>to</a:t></a:r><a:r><a:rPr /><a:t> </a:t></a:r><a:r><a:rPr /><a:t>treat</a:t></a:r><a:r><a:rPr /><a:t>”</a:t></a:r><a:r><a:rPr /><a:t> </a:t></a:r><a:r><a:rPr /><a:t>no</a:t></a:r><a:r><a:rPr /><a:t> </a:t></a:r><a:r><a:rPr /><a:t>&#1;</a:t></a:r><a:r><a:rPr /><a:t> </a:t></a:r><a:r><a:rPr /><a:t>yes</a:t></a:r><a:r><a:rPr /><a:t> </a:t></a:r><a:r><a:rPr /><a:t>&#1;</a:t></a:r><a:r><a:rPr /><a:t> </a:t></a:r><a:r><a:rPr /><a:t>where:</a:t></a:r></a:p><a:p><a:pPr lvl="0" marL="0" indent="0"><a:buNone /></a:pPr></a:p><a:p><a:pPr lvl="1"><a:buAutoNum type="arabicPeriod" /></a:pPr><a:r><a:rPr /><a:t>the</a:t></a:r><a:r><a:rPr /><a:t> </a:t></a:r><a:r><a:rPr /><a:t>results</a:t></a:r><a:r><a:rPr /><a:t> </a:t></a:r><a:r><a:rPr /><a:t>of</a:t></a:r><a:r><a:rPr /><a:t> </a:t></a:r><a:r><a:rPr /><a:t>between-group</a:t></a:r><a:r><a:rPr /><a:t> </a:t></a:r><a:r><a:rPr /><a:t>statistical</a:t></a:r><a:r><a:rPr /><a:t> </a:t></a:r><a:r><a:rPr /><a:t>comparisons</a:t></a:r><a:r><a:rPr /><a:t> </a:t></a:r><a:r><a:rPr /><a:t>are</a:t></a:r><a:r><a:rPr /><a:t> </a:t></a:r><a:r><a:rPr /><a:t>reported</a:t></a:r><a:r><a:rPr /><a:t> </a:t></a:r><a:r><a:rPr /><a:t>for</a:t></a:r><a:r><a:rPr /><a:t> </a:t></a:r><a:r><a:rPr /><a:t>at</a:t></a:r><a:r><a:rPr /><a:t> </a:t></a:r><a:r><a:rPr /><a:t>least</a:t></a:r><a:r><a:rPr /><a:t> </a:t></a:r><a:r><a:rPr /><a:t>one</a:t></a:r><a:r><a:rPr /><a:t> </a:t></a:r><a:r><a:rPr /><a:t>key</a:t></a:r><a:r><a:rPr /><a:t> </a:t></a:r><a:r><a:rPr /><a:t>outcome</a:t></a:r><a:r><a:rPr /><a:t> </a:t></a:r><a:r><a:rPr /><a:t>no</a:t></a:r><a:r><a:rPr /><a:t> </a:t></a:r><a:r><a:rPr /><a:t>&#1;</a:t></a:r><a:r><a:rPr /><a:t> </a:t></a:r><a:r><a:rPr /><a:t>yes</a:t></a:r><a:r><a:rPr /><a:t> </a:t></a:r><a:r><a:rPr /><a:t>&#1;</a:t></a:r><a:r><a:rPr /><a:t> </a:t></a:r><a:r><a:rPr /><a:t>where:</a:t></a:r></a:p><a:p><a:pPr lvl="0" marL="0" indent="0"><a:buNone /></a:pPr></a:p><a:p><a:pPr lvl="1"><a:buAutoNum type="arabicPeriod" /></a:pPr><a:r><a:rPr /><a:t>the</a:t></a:r><a:r><a:rPr /><a:t> </a:t></a:r><a:r><a:rPr /><a:t>study</a:t></a:r><a:r><a:rPr /><a:t> </a:t></a:r><a:r><a:rPr /><a:t>provides</a:t></a:r><a:r><a:rPr /><a:t> </a:t></a:r><a:r><a:rPr /><a:t>both</a:t></a:r><a:r><a:rPr /><a:t> </a:t></a:r><a:r><a:rPr /><a:t>point</a:t></a:r><a:r><a:rPr /><a:t> </a:t></a:r><a:r><a:rPr /><a:t>measures</a:t></a:r><a:r><a:rPr /><a:t> </a:t></a:r><a:r><a:rPr /><a:t>and</a:t></a:r><a:r><a:rPr /><a:t> </a:t></a:r><a:r><a:rPr /><a:t>measures</a:t></a:r><a:r><a:rPr /><a:t> </a:t></a:r><a:r><a:rPr /><a:t>of</a:t></a:r><a:r><a:rPr /><a:t> </a:t></a:r><a:r><a:rPr /><a:t>variability</a:t></a:r><a:r><a:rPr /><a:t> </a:t></a:r><a:r><a:rPr /><a:t>for</a:t></a:r><a:r><a:rPr /><a:t> </a:t></a:r><a:r><a:rPr /><a:t>at</a:t></a:r><a:r><a:rPr /><a:t> </a:t></a:r><a:r><a:rPr /><a:t>least</a:t></a:r><a:r><a:rPr /><a:t> </a:t></a:r><a:r><a:rPr /><a:t>one</a:t></a:r><a:r><a:rPr /><a:t> </a:t></a:r><a:r><a:rPr /><a:t>key</a:t></a:r><a:r><a:rPr /><a:t> </a:t></a:r><a:r><a:rPr /><a:t>outcome</a:t></a:r><a:r><a:rPr /><a:t> </a:t></a:r><a:r><a:rPr /><a:t>no</a:t></a:r><a:r><a:rPr /><a:t> </a:t></a:r><a:r><a:rPr /><a:t>&#1;</a:t></a:r><a:r><a:rPr /><a:t> </a:t></a:r><a:r><a:rPr /><a:t>yes</a:t></a:r><a:r><a:rPr /><a:t> </a:t></a:r><a:r><a:rPr /><a:t>&#1;</a:t></a:r><a:r><a:rPr /><a:t> </a:t></a:r><a:r><a:rPr /><a:t>where:</a:t></a:r></a:p></p:txBody></p:sp><p:sp><p:nvSpPr><p:cNvPr id="4" name="Slide Number Placeholder 3" /><p:cNvSpPr><a:spLocks noGrp="1" /></p:cNvSpPr><p:nvPr><p:ph type="sldNum" sz="quarter" idx="10" /></p:nvPr></p:nvSpPr><p:spPr /><p:txBody><a:bodyPr /><a:lstStyle /><a:p><a:fld id="{18BDFEC3-8487-43E8-A154-7C12CBC1FFF2}" type="slidenum"><a:rPr lang="en-US" /><a:t>14</a:t></a:fld><a:endParaRPr lang="en-US" /></a:p></p:txBody></p:sp></p:spTree></p:cSld></p:notes>
 </file>
 
 <file path=ppt/notesSlides/notesSlide14.xml><?xml version="1.0" encoding="utf-8"?>
@@ -22462,18 +21922,16 @@
                   <m:oMath xmlns:m="http://schemas.openxmlformats.org/officeDocument/2006/math">
                     <m:sSub>
                       <m:e>
-                        <m:groupChr>
-                          <m:groupChrPr>
+                        <m:acc>
+                          <m:accPr>
                             <m:chr m:val="̂"/>
-                            <m:pos m:val="top"/>
-                            <m:vertJc m:val="bot"/>
-                          </m:groupChrPr>
+                          </m:accPr>
                           <m:e>
                             <m:r>
                               <m:t>θ</m:t>
                             </m:r>
                           </m:e>
-                        </m:groupChr>
+                        </m:acc>
                       </m:e>
                       <m:sub>
                         <m:r>
@@ -22638,18 +22096,16 @@
                   <m:oMath xmlns:m="http://schemas.openxmlformats.org/officeDocument/2006/math">
                     <m:sSub>
                       <m:e>
-                        <m:groupChr>
-                          <m:groupChrPr>
+                        <m:acc>
+                          <m:accPr>
                             <m:chr m:val="̂"/>
-                            <m:pos m:val="top"/>
-                            <m:vertJc m:val="bot"/>
-                          </m:groupChrPr>
+                          </m:accPr>
                           <m:e>
                             <m:r>
                               <m:t>θ</m:t>
                             </m:r>
                           </m:e>
-                        </m:groupChr>
+                        </m:acc>
                       </m:e>
                       <m:sub>
                         <m:r>
@@ -23630,18 +23086,16 @@
                         <m:r>
                           <m:t>2</m:t>
                         </m:r>
-                        <m:groupChr>
-                          <m:groupChrPr>
+                        <m:acc>
+                          <m:accPr>
                             <m:chr m:val="̂"/>
-                            <m:pos m:val="top"/>
-                            <m:vertJc m:val="bot"/>
-                          </m:groupChrPr>
+                          </m:accPr>
                           <m:e>
                             <m:r>
                               <m:t>ρ</m:t>
                             </m:r>
                           </m:e>
-                        </m:groupChr>
+                        </m:acc>
                         <m:sSub>
                           <m:e>
                             <m:r>
@@ -24723,10 +24177,110 @@
                 <a:pPr lvl="0" marL="0" indent="0">
                   <a:buNone/>
                 </a:pPr>
-                <a:r>
-                  <a:rPr/>
-                  <a:t>$V(_i) +;(SMD)</a:t>
-                </a:r>
+                <a14:m>
+                  <m:oMath xmlns:m="http://schemas.openxmlformats.org/officeDocument/2006/math">
+                    <m:r>
+                      <m:t>V</m:t>
+                    </m:r>
+                    <m:r>
+                      <m:t>(</m:t>
+                    </m:r>
+                    <m:sSub>
+                      <m:e>
+                        <m:acc>
+                          <m:accPr>
+                            <m:chr m:val="̂"/>
+                          </m:accPr>
+                          <m:e>
+                            <m:r>
+                              <m:t>θ</m:t>
+                            </m:r>
+                          </m:e>
+                        </m:acc>
+                      </m:e>
+                      <m:sub>
+                        <m:r>
+                          <m:t>i</m:t>
+                        </m:r>
+                      </m:sub>
+                    </m:sSub>
+                    <m:r>
+                      <m:t>)</m:t>
+                    </m:r>
+                    <m:r>
+                      <m:t>≈</m:t>
+                    </m:r>
+                    <m:f>
+                      <m:fPr>
+                        <m:type m:val="bar"/>
+                      </m:fPr>
+                      <m:num>
+                        <m:r>
+                          <m:t>1</m:t>
+                        </m:r>
+                      </m:num>
+                      <m:den>
+                        <m:sSub>
+                          <m:e>
+                            <m:r>
+                              <m:t>n</m:t>
+                            </m:r>
+                          </m:e>
+                          <m:sub>
+                            <m:r>
+                              <m:t>T</m:t>
+                            </m:r>
+                          </m:sub>
+                        </m:sSub>
+                      </m:den>
+                    </m:f>
+                    <m:r>
+                      <m:t>+</m:t>
+                    </m:r>
+                    <m:f>
+                      <m:fPr>
+                        <m:type m:val="bar"/>
+                      </m:fPr>
+                      <m:num>
+                        <m:r>
+                          <m:t>1</m:t>
+                        </m:r>
+                      </m:num>
+                      <m:den>
+                        <m:sSub>
+                          <m:e>
+                            <m:r>
+                              <m:t>n</m:t>
+                            </m:r>
+                          </m:e>
+                          <m:sub>
+                            <m:r>
+                              <m:t>C</m:t>
+                            </m:r>
+                          </m:sub>
+                        </m:sSub>
+                      </m:den>
+                    </m:f>
+                    <m:r>
+                      <m:t> </m:t>
+                    </m:r>
+                    <m:r>
+                      <m:t>(</m:t>
+                    </m:r>
+                    <m:r>
+                      <m:t>S</m:t>
+                    </m:r>
+                    <m:r>
+                      <m:t>M</m:t>
+                    </m:r>
+                    <m:r>
+                      <m:t>D</m:t>
+                    </m:r>
+                    <m:r>
+                      <m:t>)</m:t>
+                    </m:r>
+                  </m:oMath>
+                </a14:m>
               </a:p>
               <a:p>
                 <a:pPr lvl="0" marL="0" indent="0">
@@ -24776,18 +24330,16 @@
                         </m:r>
                         <m:sSub>
                           <m:e>
-                            <m:groupChr>
-                              <m:groupChrPr>
+                            <m:acc>
+                              <m:accPr>
                                 <m:chr m:val="̂"/>
-                                <m:pos m:val="top"/>
-                                <m:vertJc m:val="bot"/>
-                              </m:groupChrPr>
+                              </m:accPr>
                               <m:e>
                                 <m:r>
                                   <m:t>θ</m:t>
                                 </m:r>
                               </m:e>
-                            </m:groupChr>
+                            </m:acc>
                           </m:e>
                           <m:sub>
                             <m:r>
@@ -24900,18 +24452,16 @@
                 </a:pPr>
                 <a14:m>
                   <m:oMath xmlns:m="http://schemas.openxmlformats.org/officeDocument/2006/math">
-                    <m:groupChr>
-                      <m:groupChrPr>
+                    <m:acc>
+                      <m:accPr>
                         <m:chr m:val="̂"/>
-                        <m:pos m:val="top"/>
-                        <m:vertJc m:val="bot"/>
-                      </m:groupChrPr>
+                      </m:accPr>
                       <m:e>
                         <m:r>
                           <m:t>θ</m:t>
                         </m:r>
                       </m:e>
-                    </m:groupChr>
+                    </m:acc>
                     <m:r>
                       <m:t>=</m:t>
                     </m:r>
@@ -24937,18 +24487,16 @@
                         </m:sSub>
                         <m:sSub>
                           <m:e>
-                            <m:groupChr>
-                              <m:groupChrPr>
+                            <m:acc>
+                              <m:accPr>
                                 <m:chr m:val="̂"/>
-                                <m:pos m:val="top"/>
-                                <m:vertJc m:val="bot"/>
-                              </m:groupChrPr>
+                              </m:accPr>
                               <m:e>
                                 <m:r>
                                   <m:t>θ</m:t>
                                 </m:r>
                               </m:e>
-                            </m:groupChr>
+                            </m:acc>
                           </m:e>
                           <m:sub>
                             <m:r>
@@ -24990,18 +24538,16 @@
                     <m:r>
                       <m:t>(</m:t>
                     </m:r>
-                    <m:groupChr>
-                      <m:groupChrPr>
+                    <m:acc>
+                      <m:accPr>
                         <m:chr m:val="̂"/>
-                        <m:pos m:val="top"/>
-                        <m:vertJc m:val="bot"/>
-                      </m:groupChrPr>
+                      </m:accPr>
                       <m:e>
                         <m:r>
                           <m:t>θ</m:t>
                         </m:r>
                       </m:e>
-                    </m:groupChr>
+                    </m:acc>
                     <m:r>
                       <m:t>)</m:t>
                     </m:r>
@@ -25051,18 +24597,16 @@
                       <m:num>
                         <m:sSup>
                           <m:e>
-                            <m:groupChr>
-                              <m:groupChrPr>
+                            <m:acc>
+                              <m:accPr>
                                 <m:chr m:val="̂"/>
-                                <m:pos m:val="top"/>
-                                <m:vertJc m:val="bot"/>
-                              </m:groupChrPr>
+                              </m:accPr>
                               <m:e>
                                 <m:r>
                                   <m:t>θ</m:t>
                                 </m:r>
                               </m:e>
-                            </m:groupChr>
+                            </m:acc>
                           </m:e>
                           <m:sup>
                             <m:r>
@@ -25078,18 +24622,16 @@
                         <m:r>
                           <m:t>(</m:t>
                         </m:r>
-                        <m:groupChr>
-                          <m:groupChrPr>
+                        <m:acc>
+                          <m:accPr>
                             <m:chr m:val="̂"/>
-                            <m:pos m:val="top"/>
-                            <m:vertJc m:val="bot"/>
-                          </m:groupChrPr>
+                          </m:accPr>
                           <m:e>
                             <m:r>
                               <m:t>θ</m:t>
                             </m:r>
                           </m:e>
-                        </m:groupChr>
+                        </m:acc>
                         <m:r>
                           <m:t>)</m:t>
                         </m:r>
@@ -25238,18 +24780,16 @@
                     </m:r>
                     <m:sSub>
                       <m:e>
-                        <m:groupChr>
-                          <m:groupChrPr>
+                        <m:acc>
+                          <m:accPr>
                             <m:chr m:val="̂"/>
-                            <m:pos m:val="top"/>
-                            <m:vertJc m:val="bot"/>
-                          </m:groupChrPr>
+                          </m:accPr>
                           <m:e>
                             <m:r>
                               <m:t>θ</m:t>
                             </m:r>
                           </m:e>
-                        </m:groupChr>
+                        </m:acc>
                       </m:e>
                       <m:sub>
                         <m:r>
@@ -25260,18 +24800,16 @@
                     <m:r>
                       <m:t>−</m:t>
                     </m:r>
-                    <m:groupChr>
-                      <m:groupChrPr>
+                    <m:acc>
+                      <m:accPr>
                         <m:chr m:val="̂"/>
-                        <m:pos m:val="top"/>
-                        <m:vertJc m:val="bot"/>
-                      </m:groupChrPr>
+                      </m:accPr>
                       <m:e>
                         <m:r>
                           <m:t>θ</m:t>
                         </m:r>
                       </m:e>
-                    </m:groupChr>
+                    </m:acc>
                     <m:sSup>
                       <m:e>
                         <m:r>
@@ -25489,18 +25027,16 @@
                   <m:oMath xmlns:m="http://schemas.openxmlformats.org/officeDocument/2006/math">
                     <m:sSup>
                       <m:e>
-                        <m:groupChr>
-                          <m:groupChrPr>
+                        <m:acc>
+                          <m:accPr>
                             <m:chr m:val="̂"/>
-                            <m:pos m:val="top"/>
-                            <m:vertJc m:val="bot"/>
-                          </m:groupChrPr>
+                          </m:accPr>
                           <m:e>
                             <m:r>
                               <m:t>τ</m:t>
                             </m:r>
                           </m:e>
-                        </m:groupChr>
+                        </m:acc>
                       </m:e>
                       <m:sup>
                         <m:r>
@@ -25600,18 +25136,16 @@
                         </m:r>
                         <m:sSub>
                           <m:e>
-                            <m:groupChr>
-                              <m:groupChrPr>
+                            <m:acc>
+                              <m:accPr>
                                 <m:chr m:val="̂"/>
-                                <m:pos m:val="top"/>
-                                <m:vertJc m:val="bot"/>
-                              </m:groupChrPr>
+                              </m:accPr>
                               <m:e>
                                 <m:r>
                                   <m:t>θ</m:t>
                                 </m:r>
                               </m:e>
-                            </m:groupChr>
+                            </m:acc>
                           </m:e>
                           <m:sub>
                             <m:r>
@@ -25627,18 +25161,16 @@
                         </m:r>
                         <m:sSup>
                           <m:e>
-                            <m:groupChr>
-                              <m:groupChrPr>
+                            <m:acc>
+                              <m:accPr>
                                 <m:chr m:val="̂"/>
-                                <m:pos m:val="top"/>
-                                <m:vertJc m:val="bot"/>
-                              </m:groupChrPr>
+                              </m:accPr>
                               <m:e>
                                 <m:r>
                                   <m:t>τ</m:t>
                                 </m:r>
                               </m:e>
-                            </m:groupChr>
+                            </m:acc>
                           </m:e>
                           <m:sup>
                             <m:r>

</xml_diff>